<commit_message>
Updated screen shots in Data Lake lab
</commit_message>
<xml_diff>
--- a/Content/Data Lake/Azure Data Lake.pptx
+++ b/Content/Data Lake/Azure Data Lake.pptx
@@ -207,7 +207,7 @@
           <a:p>
             <a:fld id="{2E5CA586-3557-4985-BCD4-35EF5AC8B4A4}" type="datetimeFigureOut">
               <a:rPr lang="en-US" smtClean="0"/>
-              <a:t>7/10/2016</a:t>
+              <a:t>10/1/2016</a:t>
             </a:fld>
             <a:endParaRPr lang="en-US"/>
           </a:p>
@@ -12442,16 +12442,25 @@
             <p:ph type="body" sz="quarter" idx="10"/>
           </p:nvPr>
         </p:nvSpPr>
-        <p:spPr/>
+        <p:spPr>
+          <a:xfrm>
+            <a:off x="1889617" y="4355937"/>
+            <a:ext cx="8874849" cy="1274538"/>
+          </a:xfrm>
+        </p:spPr>
         <p:txBody>
           <a:bodyPr>
-            <a:normAutofit fontScale="85000" lnSpcReduction="20000"/>
+            <a:normAutofit fontScale="85000" lnSpcReduction="10000"/>
           </a:bodyPr>
           <a:lstStyle/>
           <a:p>
             <a:r>
+              <a:rPr lang="en-US" dirty="0" smtClean="0"/>
+              <a:t>Data </a:t>
+            </a:r>
+            <a:r>
               <a:rPr lang="en-US" dirty="0"/>
-              <a:t>Query and Visualize Big Data With Data Lake Store and Data Lake Analytics</a:t>
+              <a:t>Lake Store and Data Lake Analytics</a:t>
             </a:r>
           </a:p>
         </p:txBody>
@@ -12471,7 +12480,11 @@
           <a:bodyPr/>
           <a:lstStyle/>
           <a:p>
-            <a:endParaRPr lang="en-US"/>
+            <a:r>
+              <a:rPr lang="en-US" dirty="0" smtClean="0"/>
+              <a:t>Azure Data Lake HOL.html</a:t>
+            </a:r>
+            <a:endParaRPr lang="en-US" dirty="0"/>
           </a:p>
         </p:txBody>
       </p:sp>

</xml_diff>

<commit_message>
Updated Data Lake slides
</commit_message>
<xml_diff>
--- a/Content/Data Lake/Azure Data Lake.pptx
+++ b/Content/Data Lake/Azure Data Lake.pptx
@@ -207,7 +207,7 @@
           <a:p>
             <a:fld id="{2E5CA586-3557-4985-BCD4-35EF5AC8B4A4}" type="datetimeFigureOut">
               <a:rPr lang="en-US" smtClean="0"/>
-              <a:t>10/1/2016</a:t>
+              <a:t>2/15/2017</a:t>
             </a:fld>
             <a:endParaRPr lang="en-US"/>
           </a:p>
@@ -12571,7 +12571,23 @@
           <a:p>
             <a:r>
               <a:rPr lang="en-US" dirty="0"/>
-              <a:t>What is a “data lake”?</a:t>
+              <a:t>What is a </a:t>
+            </a:r>
+            <a:r>
+              <a:rPr lang="en-US" dirty="0" smtClean="0"/>
+              <a:t>“Data </a:t>
+            </a:r>
+            <a:r>
+              <a:rPr lang="en-US" dirty="0"/>
+              <a:t>L</a:t>
+            </a:r>
+            <a:r>
+              <a:rPr lang="en-US" dirty="0" smtClean="0"/>
+              <a:t>ake</a:t>
+            </a:r>
+            <a:r>
+              <a:rPr lang="en-US" dirty="0"/>
+              <a:t>”?</a:t>
             </a:r>
           </a:p>
         </p:txBody>
@@ -12655,9 +12671,18 @@
           <a:lstStyle/>
           <a:p>
             <a:r>
+              <a:rPr lang="en-US" dirty="0" smtClean="0"/>
+              <a:t>Azure </a:t>
+            </a:r>
+            <a:r>
               <a:rPr lang="en-US" dirty="0"/>
-              <a:t>What is Azure Data Lake?</a:t>
-            </a:r>
+              <a:t>Data </a:t>
+            </a:r>
+            <a:r>
+              <a:rPr lang="en-US" dirty="0" smtClean="0"/>
+              <a:t>Lake</a:t>
+            </a:r>
+            <a:endParaRPr lang="en-US" dirty="0"/>
           </a:p>
         </p:txBody>
       </p:sp>
@@ -13406,7 +13431,7 @@
         </p:nvSpPr>
         <p:spPr>
           <a:xfrm>
-            <a:off x="2949522" y="2787279"/>
+            <a:off x="3320584" y="2423975"/>
             <a:ext cx="1488997" cy="249299"/>
           </a:xfrm>
           <a:prstGeom prst="rect">
@@ -13492,7 +13517,7 @@
         </p:nvSpPr>
         <p:spPr>
           <a:xfrm>
-            <a:off x="3023401" y="4353269"/>
+            <a:off x="2919008" y="4133184"/>
             <a:ext cx="1232966" cy="249299"/>
           </a:xfrm>
           <a:prstGeom prst="rect">
@@ -13578,7 +13603,7 @@
         </p:nvSpPr>
         <p:spPr>
           <a:xfrm>
-            <a:off x="7554009" y="2346891"/>
+            <a:off x="6916014" y="2129620"/>
             <a:ext cx="1275990" cy="249299"/>
           </a:xfrm>
           <a:prstGeom prst="rect">
@@ -13664,7 +13689,7 @@
         </p:nvSpPr>
         <p:spPr>
           <a:xfrm>
-            <a:off x="7755297" y="3658060"/>
+            <a:off x="7870193" y="3410594"/>
             <a:ext cx="1525931" cy="249299"/>
           </a:xfrm>
           <a:prstGeom prst="rect">
@@ -13750,7 +13775,7 @@
         </p:nvSpPr>
         <p:spPr>
           <a:xfrm>
-            <a:off x="8129673" y="4904690"/>
+            <a:off x="8383684" y="4694173"/>
             <a:ext cx="1488997" cy="249299"/>
           </a:xfrm>
           <a:prstGeom prst="rect">
@@ -14775,8 +14800,12 @@
           </a:p>
           <a:p>
             <a:r>
+              <a:rPr lang="en-US" sz="3200" dirty="0" smtClean="0"/>
+              <a:t>U-SQL – query </a:t>
+            </a:r>
+            <a:r>
               <a:rPr lang="en-US" sz="3200" dirty="0"/>
-              <a:t>U-SQL… query language rooted in SQL and C#</a:t>
+              <a:t>language rooted in SQL and C#</a:t>
             </a:r>
             <a:endParaRPr lang="en-US" dirty="0"/>
           </a:p>

</xml_diff>